<commit_message>
third draft for integration test
</commit_message>
<xml_diff>
--- a/bts_final-presentaion_0801_draft3_HY.pptx
+++ b/bts_final-presentaion_0801_draft3_HY.pptx
@@ -5,7 +5,7 @@
     <p:sldMasterId id="2147483648" r:id="rId1"/>
   </p:sldMasterIdLst>
   <p:notesMasterIdLst>
-    <p:notesMasterId r:id="rId9"/>
+    <p:notesMasterId r:id="rId8"/>
   </p:notesMasterIdLst>
   <p:sldIdLst>
     <p:sldId id="270" r:id="rId2"/>
@@ -13,8 +13,7 @@
     <p:sldId id="301" r:id="rId4"/>
     <p:sldId id="308" r:id="rId5"/>
     <p:sldId id="307" r:id="rId6"/>
-    <p:sldId id="309" r:id="rId7"/>
-    <p:sldId id="293" r:id="rId8"/>
+    <p:sldId id="293" r:id="rId7"/>
   </p:sldIdLst>
   <p:sldSz cx="9144000" cy="6858000" type="screen4x3"/>
   <p:notesSz cx="6858000" cy="9144000"/>
@@ -123,7 +122,6 @@
             <p14:sldId id="301"/>
             <p14:sldId id="308"/>
             <p14:sldId id="307"/>
-            <p14:sldId id="309"/>
             <p14:sldId id="293"/>
           </p14:sldIdLst>
         </p14:section>
@@ -229,7 +227,7 @@
           <a:p>
             <a:fld id="{712325F5-C9E2-904D-9196-95C4D5092AAB}" type="datetimeFigureOut">
               <a:rPr kumimoji="1" lang="ko-KR" altLang="en-US" smtClean="0"/>
-              <a:t>2018-07-31</a:t>
+              <a:t>2018-08-01</a:t>
             </a:fld>
             <a:endParaRPr kumimoji="1" lang="ko-KR" altLang="en-US"/>
           </a:p>
@@ -847,37 +845,6 @@
             </a:r>
             <a:endParaRPr lang="en-US" altLang="ko-KR" dirty="0"/>
           </a:p>
-          <a:p>
-            <a:r>
-              <a:rPr lang="ko-KR" altLang="en-US" dirty="0" err="1"/>
-              <a:t>유닛테스트</a:t>
-            </a:r>
-            <a:r>
-              <a:rPr lang="ko-KR" altLang="en-US" dirty="0"/>
-              <a:t> 작성을 위해 </a:t>
-            </a:r>
-            <a:r>
-              <a:rPr lang="ko-KR" altLang="en-US" dirty="0" err="1"/>
-              <a:t>디테일한</a:t>
-            </a:r>
-            <a:r>
-              <a:rPr lang="ko-KR" altLang="en-US" dirty="0"/>
-              <a:t> </a:t>
-            </a:r>
-            <a:r>
-              <a:rPr lang="ko-KR" altLang="en-US" dirty="0" err="1"/>
-              <a:t>스펙을</a:t>
-            </a:r>
-            <a:r>
-              <a:rPr lang="ko-KR" altLang="en-US" dirty="0"/>
-              <a:t> 정리 했는가</a:t>
-            </a:r>
-            <a:r>
-              <a:rPr lang="en-US" altLang="ko-KR" dirty="0"/>
-              <a:t>?</a:t>
-            </a:r>
-            <a:endParaRPr lang="ko-KR" altLang="en-US" dirty="0"/>
-          </a:p>
         </p:txBody>
       </p:sp>
       <p:sp>
@@ -898,94 +865,6 @@
             <a:fld id="{3AA2FE0F-B235-F44B-9384-2E1E3B262E89}" type="slidenum">
               <a:rPr kumimoji="1" lang="ko-KR" altLang="en-US" smtClean="0"/>
               <a:t>6</a:t>
-            </a:fld>
-            <a:endParaRPr kumimoji="1" lang="ko-KR" altLang="en-US"/>
-          </a:p>
-        </p:txBody>
-      </p:sp>
-    </p:spTree>
-    <p:extLst>
-      <p:ext uri="{BB962C8B-B14F-4D97-AF65-F5344CB8AC3E}">
-        <p14:creationId xmlns:p14="http://schemas.microsoft.com/office/powerpoint/2010/main" val="1626233202"/>
-      </p:ext>
-    </p:extLst>
-  </p:cSld>
-  <p:clrMapOvr>
-    <a:masterClrMapping/>
-  </p:clrMapOvr>
-</p:notes>
-</file>
-
-<file path=ppt/notesSlides/notesSlide5.xml><?xml version="1.0" encoding="utf-8"?>
-<p:notes xmlns:a="http://schemas.openxmlformats.org/drawingml/2006/main" xmlns:r="http://schemas.openxmlformats.org/officeDocument/2006/relationships" xmlns:p="http://schemas.openxmlformats.org/presentationml/2006/main">
-  <p:cSld>
-    <p:spTree>
-      <p:nvGrpSpPr>
-        <p:cNvPr id="1" name=""/>
-        <p:cNvGrpSpPr/>
-        <p:nvPr/>
-      </p:nvGrpSpPr>
-      <p:grpSpPr>
-        <a:xfrm>
-          <a:off x="0" y="0"/>
-          <a:ext cx="0" cy="0"/>
-          <a:chOff x="0" y="0"/>
-          <a:chExt cx="0" cy="0"/>
-        </a:xfrm>
-      </p:grpSpPr>
-      <p:sp>
-        <p:nvSpPr>
-          <p:cNvPr id="2" name="슬라이드 이미지 개체 틀 1"/>
-          <p:cNvSpPr>
-            <a:spLocks noGrp="1" noRot="1" noChangeAspect="1"/>
-          </p:cNvSpPr>
-          <p:nvPr>
-            <p:ph type="sldImg"/>
-          </p:nvPr>
-        </p:nvSpPr>
-        <p:spPr/>
-      </p:sp>
-      <p:sp>
-        <p:nvSpPr>
-          <p:cNvPr id="3" name="슬라이드 노트 개체 틀 2"/>
-          <p:cNvSpPr>
-            <a:spLocks noGrp="1"/>
-          </p:cNvSpPr>
-          <p:nvPr>
-            <p:ph type="body" idx="1"/>
-          </p:nvPr>
-        </p:nvSpPr>
-        <p:spPr/>
-        <p:txBody>
-          <a:bodyPr/>
-          <a:lstStyle/>
-          <a:p>
-            <a:r>
-              <a:rPr lang="ko-KR" altLang="en-US" dirty="0"/>
-              <a:t>예상 질문</a:t>
-            </a:r>
-            <a:endParaRPr lang="en-US" altLang="ko-KR" dirty="0"/>
-          </a:p>
-        </p:txBody>
-      </p:sp>
-      <p:sp>
-        <p:nvSpPr>
-          <p:cNvPr id="4" name="슬라이드 번호 개체 틀 3"/>
-          <p:cNvSpPr>
-            <a:spLocks noGrp="1"/>
-          </p:cNvSpPr>
-          <p:nvPr>
-            <p:ph type="sldNum" sz="quarter" idx="10"/>
-          </p:nvPr>
-        </p:nvSpPr>
-        <p:spPr/>
-        <p:txBody>
-          <a:bodyPr/>
-          <a:lstStyle/>
-          <a:p>
-            <a:fld id="{3AA2FE0F-B235-F44B-9384-2E1E3B262E89}" type="slidenum">
-              <a:rPr kumimoji="1" lang="ko-KR" altLang="en-US" smtClean="0"/>
-              <a:t>7</a:t>
             </a:fld>
             <a:endParaRPr kumimoji="1" lang="ko-KR" altLang="en-US"/>
           </a:p>
@@ -1183,7 +1062,7 @@
           <a:p>
             <a:fld id="{81016135-A4DB-5940-9618-602446510983}" type="datetime1">
               <a:rPr lang="ko-KR" altLang="en-US" smtClean="0"/>
-              <a:t>2018-07-31</a:t>
+              <a:t>2018-08-01</a:t>
             </a:fld>
             <a:endParaRPr lang="ko-KR" altLang="en-US"/>
           </a:p>
@@ -1351,7 +1230,7 @@
           <a:p>
             <a:fld id="{BD744770-A14D-6941-A904-58BC2931730E}" type="datetime1">
               <a:rPr lang="ko-KR" altLang="en-US" smtClean="0"/>
-              <a:t>2018-07-31</a:t>
+              <a:t>2018-08-01</a:t>
             </a:fld>
             <a:endParaRPr lang="ko-KR" altLang="en-US"/>
           </a:p>
@@ -1529,7 +1408,7 @@
           <a:p>
             <a:fld id="{30DF2F99-AA6B-6247-914B-5F6E585CCF74}" type="datetime1">
               <a:rPr lang="ko-KR" altLang="en-US" smtClean="0"/>
-              <a:t>2018-07-31</a:t>
+              <a:t>2018-08-01</a:t>
             </a:fld>
             <a:endParaRPr lang="ko-KR" altLang="en-US"/>
           </a:p>
@@ -1697,7 +1576,7 @@
           <a:p>
             <a:fld id="{B19DC939-4D94-9049-B99C-915C87CD8943}" type="datetime1">
               <a:rPr lang="ko-KR" altLang="en-US" smtClean="0"/>
-              <a:t>2018-07-31</a:t>
+              <a:t>2018-08-01</a:t>
             </a:fld>
             <a:endParaRPr lang="ko-KR" altLang="en-US"/>
           </a:p>
@@ -1942,7 +1821,7 @@
           <a:p>
             <a:fld id="{93ABA6C5-3672-5C41-A2A3-675E6E21B724}" type="datetime1">
               <a:rPr lang="ko-KR" altLang="en-US" smtClean="0"/>
-              <a:t>2018-07-31</a:t>
+              <a:t>2018-08-01</a:t>
             </a:fld>
             <a:endParaRPr lang="ko-KR" altLang="en-US"/>
           </a:p>
@@ -2227,7 +2106,7 @@
           <a:p>
             <a:fld id="{13F61A0F-950E-D045-B518-F0C90A574A66}" type="datetime1">
               <a:rPr lang="ko-KR" altLang="en-US" smtClean="0"/>
-              <a:t>2018-07-31</a:t>
+              <a:t>2018-08-01</a:t>
             </a:fld>
             <a:endParaRPr lang="ko-KR" altLang="en-US"/>
           </a:p>
@@ -2646,7 +2525,7 @@
           <a:p>
             <a:fld id="{3181B833-30BB-BD4A-AAEB-AEB4820343F5}" type="datetime1">
               <a:rPr lang="ko-KR" altLang="en-US" smtClean="0"/>
-              <a:t>2018-07-31</a:t>
+              <a:t>2018-08-01</a:t>
             </a:fld>
             <a:endParaRPr lang="ko-KR" altLang="en-US"/>
           </a:p>
@@ -2763,7 +2642,7 @@
           <a:p>
             <a:fld id="{D1E0FACA-138F-0B49-86E8-6EFD6A6FD36E}" type="datetime1">
               <a:rPr lang="ko-KR" altLang="en-US" smtClean="0"/>
-              <a:t>2018-07-31</a:t>
+              <a:t>2018-08-01</a:t>
             </a:fld>
             <a:endParaRPr lang="ko-KR" altLang="en-US"/>
           </a:p>
@@ -2858,7 +2737,7 @@
           <a:p>
             <a:fld id="{790D20DD-29E9-F643-8A57-5893DCB35680}" type="datetime1">
               <a:rPr lang="ko-KR" altLang="en-US" smtClean="0"/>
-              <a:t>2018-07-31</a:t>
+              <a:t>2018-08-01</a:t>
             </a:fld>
             <a:endParaRPr lang="ko-KR" altLang="en-US"/>
           </a:p>
@@ -3133,7 +3012,7 @@
           <a:p>
             <a:fld id="{2DAA6339-3440-B046-B02E-1540F78394BD}" type="datetime1">
               <a:rPr lang="ko-KR" altLang="en-US" smtClean="0"/>
-              <a:t>2018-07-31</a:t>
+              <a:t>2018-08-01</a:t>
             </a:fld>
             <a:endParaRPr lang="ko-KR" altLang="en-US"/>
           </a:p>
@@ -3385,7 +3264,7 @@
           <a:p>
             <a:fld id="{E50044E2-E6DA-C246-B020-23F7EAFA2E4E}" type="datetime1">
               <a:rPr lang="ko-KR" altLang="en-US" smtClean="0"/>
-              <a:t>2018-07-31</a:t>
+              <a:t>2018-08-01</a:t>
             </a:fld>
             <a:endParaRPr lang="ko-KR" altLang="en-US"/>
           </a:p>
@@ -3596,7 +3475,7 @@
           <a:p>
             <a:fld id="{F58FF9CF-F15B-A142-A635-C5F74D42CE0E}" type="datetime1">
               <a:rPr lang="ko-KR" altLang="en-US" smtClean="0"/>
-              <a:t>2018-07-31</a:t>
+              <a:t>2018-08-01</a:t>
             </a:fld>
             <a:endParaRPr lang="ko-KR" altLang="en-US"/>
           </a:p>
@@ -4430,10 +4309,6 @@
               </a:rPr>
               <a:t>Resource Risk</a:t>
             </a:r>
-            <a:endParaRPr lang="en-US" altLang="ko-KR" sz="2000" dirty="0" smtClean="0">
-              <a:latin typeface="Arial" panose="020B0604020202020204" pitchFamily="34" charset="0"/>
-              <a:cs typeface="Arial" panose="020B0604020202020204" pitchFamily="34" charset="0"/>
-            </a:endParaRPr>
           </a:p>
           <a:p>
             <a:pPr lvl="1">
@@ -4703,7 +4578,17 @@
                 <a:latin typeface="Arial" panose="020B0604020202020204" pitchFamily="34" charset="0"/>
                 <a:cs typeface="Arial" panose="020B0604020202020204" pitchFamily="34" charset="0"/>
               </a:rPr>
-              <a:t>Project Risk Management (to be edited)</a:t>
+              <a:t>Project Risk </a:t>
+            </a:r>
+            <a:r>
+              <a:rPr lang="en-US" altLang="ko-KR" sz="2400" b="1" dirty="0" smtClean="0">
+                <a:solidFill>
+                  <a:srgbClr val="FF0000"/>
+                </a:solidFill>
+                <a:latin typeface="Arial" panose="020B0604020202020204" pitchFamily="34" charset="0"/>
+                <a:cs typeface="Arial" panose="020B0604020202020204" pitchFamily="34" charset="0"/>
+              </a:rPr>
+              <a:t>Management</a:t>
             </a:r>
             <a:endParaRPr lang="ko-KR" altLang="en-US" sz="2400" b="1" dirty="0">
               <a:solidFill>
@@ -4751,58 +4636,6 @@
           </a:prstGeom>
         </p:spPr>
       </p:pic>
-      <p:sp>
-        <p:nvSpPr>
-          <p:cNvPr id="11" name="TextBox 10">
-            <a:extLst>
-              <a:ext uri="{FF2B5EF4-FFF2-40B4-BE49-F238E27FC236}">
-                <a16:creationId xmlns:a16="http://schemas.microsoft.com/office/drawing/2014/main" xmlns="" id="{0BA35872-4DD6-3B46-9D3F-9FAA18C9CE27}"/>
-              </a:ext>
-            </a:extLst>
-          </p:cNvPr>
-          <p:cNvSpPr txBox="1"/>
-          <p:nvPr/>
-        </p:nvSpPr>
-        <p:spPr>
-          <a:xfrm>
-            <a:off x="6876256" y="250419"/>
-            <a:ext cx="540533" cy="369332"/>
-          </a:xfrm>
-          <a:prstGeom prst="rect">
-            <a:avLst/>
-          </a:prstGeom>
-          <a:noFill/>
-        </p:spPr>
-        <p:txBody>
-          <a:bodyPr wrap="none" rtlCol="0">
-            <a:spAutoFit/>
-          </a:bodyPr>
-          <a:lstStyle/>
-          <a:p>
-            <a:r>
-              <a:rPr kumimoji="1" lang="ko-KR" altLang="en-US" dirty="0">
-                <a:solidFill>
-                  <a:srgbClr val="FF0000"/>
-                </a:solidFill>
-              </a:rPr>
-              <a:t>황</a:t>
-            </a:r>
-            <a:r>
-              <a:rPr kumimoji="1" lang="en-US" altLang="ko-KR" dirty="0">
-                <a:solidFill>
-                  <a:srgbClr val="FF0000"/>
-                </a:solidFill>
-              </a:rPr>
-              <a:t>S</a:t>
-            </a:r>
-            <a:endParaRPr kumimoji="1" lang="ko-KR" altLang="en-US" dirty="0">
-              <a:solidFill>
-                <a:srgbClr val="FF0000"/>
-              </a:solidFill>
-            </a:endParaRPr>
-          </a:p>
-        </p:txBody>
-      </p:sp>
     </p:spTree>
     <p:extLst>
       <p:ext uri="{BB962C8B-B14F-4D97-AF65-F5344CB8AC3E}">
@@ -5021,8 +4854,19 @@
                 <a:latin typeface="Arial" panose="020B0604020202020204" pitchFamily="34" charset="0"/>
                 <a:cs typeface="Arial" panose="020B0604020202020204" pitchFamily="34" charset="0"/>
               </a:rPr>
-              <a:t>Outputs (ref. appendix.5)</a:t>
-            </a:r>
+              <a:t>Outputs (ref. </a:t>
+            </a:r>
+            <a:r>
+              <a:rPr lang="en-US" altLang="ko-KR" sz="1600" b="1" dirty="0" smtClean="0">
+                <a:latin typeface="Arial" panose="020B0604020202020204" pitchFamily="34" charset="0"/>
+                <a:cs typeface="Arial" panose="020B0604020202020204" pitchFamily="34" charset="0"/>
+              </a:rPr>
+              <a:t>appendix.4)</a:t>
+            </a:r>
+            <a:endParaRPr lang="en-US" altLang="ko-KR" sz="1600" b="1" dirty="0">
+              <a:latin typeface="Arial" panose="020B0604020202020204" pitchFamily="34" charset="0"/>
+              <a:cs typeface="Arial" panose="020B0604020202020204" pitchFamily="34" charset="0"/>
+            </a:endParaRPr>
           </a:p>
           <a:p>
             <a:pPr marL="742950" lvl="1" indent="-285750">
@@ -5053,10 +4897,6 @@
               </a:rPr>
               <a:t> - 3, PlayerTest.java - 4</a:t>
             </a:r>
-            <a:endParaRPr lang="en-US" altLang="ko-KR" sz="1400" dirty="0" smtClean="0">
-              <a:latin typeface="Arial" panose="020B0604020202020204" pitchFamily="34" charset="0"/>
-              <a:cs typeface="Arial" panose="020B0604020202020204" pitchFamily="34" charset="0"/>
-            </a:endParaRPr>
           </a:p>
           <a:p>
             <a:pPr marL="742950" lvl="1" indent="-285750">
@@ -5270,13 +5110,6 @@
               </a:rPr>
               <a:t>programs (automotive, aviation-related programs, etc.).</a:t>
             </a:r>
-            <a:endParaRPr lang="en-US" altLang="ko-KR" sz="1400" dirty="0">
-              <a:solidFill>
-                <a:srgbClr val="FF0000"/>
-              </a:solidFill>
-              <a:latin typeface="Arial" panose="020B0604020202020204" pitchFamily="34" charset="0"/>
-              <a:cs typeface="Arial" panose="020B0604020202020204" pitchFamily="34" charset="0"/>
-            </a:endParaRPr>
           </a:p>
         </p:txBody>
       </p:sp>
@@ -5364,58 +5197,6 @@
           </a:prstGeom>
         </p:spPr>
       </p:pic>
-      <p:sp>
-        <p:nvSpPr>
-          <p:cNvPr id="11" name="TextBox 10">
-            <a:extLst>
-              <a:ext uri="{FF2B5EF4-FFF2-40B4-BE49-F238E27FC236}">
-                <a16:creationId xmlns:a16="http://schemas.microsoft.com/office/drawing/2014/main" xmlns="" id="{F23D15EE-92DC-0C48-8648-2657CCC5B593}"/>
-              </a:ext>
-            </a:extLst>
-          </p:cNvPr>
-          <p:cNvSpPr txBox="1"/>
-          <p:nvPr/>
-        </p:nvSpPr>
-        <p:spPr>
-          <a:xfrm>
-            <a:off x="6876256" y="250419"/>
-            <a:ext cx="540533" cy="369332"/>
-          </a:xfrm>
-          <a:prstGeom prst="rect">
-            <a:avLst/>
-          </a:prstGeom>
-          <a:noFill/>
-        </p:spPr>
-        <p:txBody>
-          <a:bodyPr wrap="none" rtlCol="0">
-            <a:spAutoFit/>
-          </a:bodyPr>
-          <a:lstStyle/>
-          <a:p>
-            <a:r>
-              <a:rPr kumimoji="1" lang="ko-KR" altLang="en-US" dirty="0">
-                <a:solidFill>
-                  <a:srgbClr val="FF0000"/>
-                </a:solidFill>
-              </a:rPr>
-              <a:t>황</a:t>
-            </a:r>
-            <a:r>
-              <a:rPr kumimoji="1" lang="en-US" altLang="ko-KR" dirty="0">
-                <a:solidFill>
-                  <a:srgbClr val="FF0000"/>
-                </a:solidFill>
-              </a:rPr>
-              <a:t>S</a:t>
-            </a:r>
-            <a:endParaRPr kumimoji="1" lang="ko-KR" altLang="en-US" dirty="0">
-              <a:solidFill>
-                <a:srgbClr val="FF0000"/>
-              </a:solidFill>
-            </a:endParaRPr>
-          </a:p>
-        </p:txBody>
-      </p:sp>
       <p:sp>
         <p:nvSpPr>
           <p:cNvPr id="4" name="직사각형 3"/>
@@ -5546,8 +5327,8 @@
         </p:nvSpPr>
         <p:spPr>
           <a:xfrm>
-            <a:off x="256071" y="836712"/>
-            <a:ext cx="8496944" cy="5832366"/>
+            <a:off x="256071" y="764704"/>
+            <a:ext cx="8496944" cy="6140142"/>
           </a:xfrm>
           <a:prstGeom prst="rect">
             <a:avLst/>
@@ -5568,19 +5349,30 @@
               <a:buChar char="•"/>
             </a:pPr>
             <a:r>
-              <a:rPr lang="en-US" altLang="ko-KR" sz="2000" b="1" dirty="0">
+              <a:rPr lang="en-US" altLang="ko-KR" b="1" dirty="0">
                 <a:latin typeface="Arial" panose="020B0604020202020204" pitchFamily="34" charset="0"/>
                 <a:cs typeface="Arial" panose="020B0604020202020204" pitchFamily="34" charset="0"/>
               </a:rPr>
               <a:t>Goal </a:t>
             </a:r>
             <a:r>
-              <a:rPr lang="en-US" altLang="ko-KR" sz="2000" dirty="0">
-                <a:latin typeface="Arial" panose="020B0604020202020204" pitchFamily="34" charset="0"/>
-                <a:cs typeface="Arial" panose="020B0604020202020204" pitchFamily="34" charset="0"/>
-              </a:rPr>
-              <a:t>: Merge the new features into one repository and verify that they are working properly.</a:t>
-            </a:r>
+              <a:rPr lang="en-US" altLang="ko-KR" dirty="0">
+                <a:latin typeface="Arial" panose="020B0604020202020204" pitchFamily="34" charset="0"/>
+                <a:cs typeface="Arial" panose="020B0604020202020204" pitchFamily="34" charset="0"/>
+              </a:rPr>
+              <a:t>: Merge the new features into one repository and verify that they are working properly</a:t>
+            </a:r>
+            <a:r>
+              <a:rPr lang="en-US" altLang="ko-KR" dirty="0" smtClean="0">
+                <a:latin typeface="Arial" panose="020B0604020202020204" pitchFamily="34" charset="0"/>
+                <a:cs typeface="Arial" panose="020B0604020202020204" pitchFamily="34" charset="0"/>
+              </a:rPr>
+              <a:t>. (Big-bang integration)</a:t>
+            </a:r>
+            <a:endParaRPr lang="en-US" altLang="ko-KR" dirty="0">
+              <a:latin typeface="Arial" panose="020B0604020202020204" pitchFamily="34" charset="0"/>
+              <a:cs typeface="Arial" panose="020B0604020202020204" pitchFamily="34" charset="0"/>
+            </a:endParaRPr>
           </a:p>
           <a:p>
             <a:pPr marL="285750" indent="-285750">
@@ -5591,7 +5383,7 @@
               <a:buChar char="•"/>
             </a:pPr>
             <a:r>
-              <a:rPr lang="en-US" altLang="ko-KR" sz="2000" b="1" dirty="0">
+              <a:rPr lang="en-US" altLang="ko-KR" b="1" dirty="0">
                 <a:latin typeface="Arial" panose="020B0604020202020204" pitchFamily="34" charset="0"/>
                 <a:cs typeface="Arial" panose="020B0604020202020204" pitchFamily="34" charset="0"/>
               </a:rPr>
@@ -5607,12 +5399,37 @@
               <a:buChar char="ü"/>
             </a:pPr>
             <a:r>
-              <a:rPr lang="en-US" altLang="ko-KR" dirty="0">
-                <a:latin typeface="Arial" panose="020B0604020202020204" pitchFamily="34" charset="0"/>
-                <a:cs typeface="Arial" panose="020B0604020202020204" pitchFamily="34" charset="0"/>
-              </a:rPr>
-              <a:t>Test case result : 100% pass</a:t>
-            </a:r>
+              <a:rPr lang="en-US" altLang="ko-KR" sz="1600" dirty="0">
+                <a:latin typeface="Arial" panose="020B0604020202020204" pitchFamily="34" charset="0"/>
+                <a:cs typeface="Arial" panose="020B0604020202020204" pitchFamily="34" charset="0"/>
+              </a:rPr>
+              <a:t>Test case </a:t>
+            </a:r>
+            <a:r>
+              <a:rPr lang="en-US" altLang="ko-KR" sz="1600" dirty="0" smtClean="0">
+                <a:latin typeface="Arial" panose="020B0604020202020204" pitchFamily="34" charset="0"/>
+                <a:cs typeface="Arial" panose="020B0604020202020204" pitchFamily="34" charset="0"/>
+              </a:rPr>
+              <a:t>pass ratio : </a:t>
+            </a:r>
+            <a:r>
+              <a:rPr lang="en-US" altLang="ko-KR" sz="1600" dirty="0">
+                <a:latin typeface="Arial" panose="020B0604020202020204" pitchFamily="34" charset="0"/>
+                <a:cs typeface="Arial" panose="020B0604020202020204" pitchFamily="34" charset="0"/>
+              </a:rPr>
+              <a:t>100</a:t>
+            </a:r>
+            <a:r>
+              <a:rPr lang="en-US" altLang="ko-KR" sz="1600" dirty="0" smtClean="0">
+                <a:latin typeface="Arial" panose="020B0604020202020204" pitchFamily="34" charset="0"/>
+                <a:cs typeface="Arial" panose="020B0604020202020204" pitchFamily="34" charset="0"/>
+              </a:rPr>
+              <a:t>%</a:t>
+            </a:r>
+            <a:endParaRPr lang="en-US" altLang="ko-KR" sz="1600" dirty="0">
+              <a:latin typeface="Arial" panose="020B0604020202020204" pitchFamily="34" charset="0"/>
+              <a:cs typeface="Arial" panose="020B0604020202020204" pitchFamily="34" charset="0"/>
+            </a:endParaRPr>
           </a:p>
           <a:p>
             <a:pPr marL="285750" indent="-285750">
@@ -5623,7 +5440,7 @@
               <a:buChar char="•"/>
             </a:pPr>
             <a:r>
-              <a:rPr lang="en-US" altLang="ko-KR" b="1" dirty="0">
+              <a:rPr lang="en-US" altLang="ko-KR" sz="1600" b="1" dirty="0">
                 <a:latin typeface="Arial" panose="020B0604020202020204" pitchFamily="34" charset="0"/>
                 <a:cs typeface="Arial" panose="020B0604020202020204" pitchFamily="34" charset="0"/>
               </a:rPr>
@@ -5639,11 +5456,18 @@
               <a:buChar char="ü"/>
             </a:pPr>
             <a:r>
-              <a:rPr lang="en-US" altLang="ko-KR" dirty="0">
-                <a:latin typeface="Arial" panose="020B0604020202020204" pitchFamily="34" charset="0"/>
-                <a:cs typeface="Arial" panose="020B0604020202020204" pitchFamily="34" charset="0"/>
-              </a:rPr>
-              <a:t>Planned Effort : 45h (7/18~20, 2hours a day, all members) -&gt; 19h 30m</a:t>
+              <a:rPr lang="en-US" altLang="ko-KR" sz="1600" dirty="0">
+                <a:latin typeface="Arial" panose="020B0604020202020204" pitchFamily="34" charset="0"/>
+                <a:cs typeface="Arial" panose="020B0604020202020204" pitchFamily="34" charset="0"/>
+              </a:rPr>
+              <a:t>Planned Effort : </a:t>
+            </a:r>
+            <a:r>
+              <a:rPr lang="en-US" altLang="ko-KR" sz="1600" dirty="0" smtClean="0">
+                <a:latin typeface="Arial" panose="020B0604020202020204" pitchFamily="34" charset="0"/>
+                <a:cs typeface="Arial" panose="020B0604020202020204" pitchFamily="34" charset="0"/>
+              </a:rPr>
+              <a:t>60h</a:t>
             </a:r>
           </a:p>
           <a:p>
@@ -5655,12 +5479,50 @@
               <a:buChar char="ü"/>
             </a:pPr>
             <a:r>
-              <a:rPr lang="en-US" altLang="ko-KR" dirty="0">
-                <a:latin typeface="Arial" panose="020B0604020202020204" pitchFamily="34" charset="0"/>
-                <a:cs typeface="Arial" panose="020B0604020202020204" pitchFamily="34" charset="0"/>
-              </a:rPr>
-              <a:t>Actual Effort : 15h 40m</a:t>
-            </a:r>
+              <a:rPr lang="en-US" altLang="ko-KR" sz="1600" dirty="0" smtClean="0">
+                <a:latin typeface="Arial" panose="020B0604020202020204" pitchFamily="34" charset="0"/>
+                <a:cs typeface="Arial" panose="020B0604020202020204" pitchFamily="34" charset="0"/>
+              </a:rPr>
+              <a:t>Estimated Effort : 46.5h</a:t>
+            </a:r>
+            <a:endParaRPr lang="en-US" altLang="ko-KR" sz="1600" dirty="0">
+              <a:latin typeface="Arial" panose="020B0604020202020204" pitchFamily="34" charset="0"/>
+              <a:cs typeface="Arial" panose="020B0604020202020204" pitchFamily="34" charset="0"/>
+            </a:endParaRPr>
+          </a:p>
+          <a:p>
+            <a:pPr marL="742950" lvl="1" indent="-285750">
+              <a:lnSpc>
+                <a:spcPct val="150000"/>
+              </a:lnSpc>
+              <a:buFont typeface="Wingdings" pitchFamily="2" charset="2"/>
+              <a:buChar char="ü"/>
+            </a:pPr>
+            <a:r>
+              <a:rPr lang="en-US" altLang="ko-KR" sz="1600" dirty="0" smtClean="0">
+                <a:latin typeface="Arial" panose="020B0604020202020204" pitchFamily="34" charset="0"/>
+                <a:cs typeface="Arial" panose="020B0604020202020204" pitchFamily="34" charset="0"/>
+              </a:rPr>
+              <a:t>Actual </a:t>
+            </a:r>
+            <a:r>
+              <a:rPr lang="en-US" altLang="ko-KR" sz="1600" dirty="0">
+                <a:latin typeface="Arial" panose="020B0604020202020204" pitchFamily="34" charset="0"/>
+                <a:cs typeface="Arial" panose="020B0604020202020204" pitchFamily="34" charset="0"/>
+              </a:rPr>
+              <a:t>Effort : </a:t>
+            </a:r>
+            <a:r>
+              <a:rPr lang="en-US" altLang="ko-KR" sz="1600" dirty="0" smtClean="0">
+                <a:latin typeface="Arial" panose="020B0604020202020204" pitchFamily="34" charset="0"/>
+                <a:cs typeface="Arial" panose="020B0604020202020204" pitchFamily="34" charset="0"/>
+              </a:rPr>
+              <a:t>27.5h</a:t>
+            </a:r>
+            <a:endParaRPr lang="en-US" altLang="ko-KR" sz="1600" dirty="0">
+              <a:latin typeface="Arial" panose="020B0604020202020204" pitchFamily="34" charset="0"/>
+              <a:cs typeface="Arial" panose="020B0604020202020204" pitchFamily="34" charset="0"/>
+            </a:endParaRPr>
           </a:p>
           <a:p>
             <a:pPr marL="285750" indent="-285750">
@@ -5671,12 +5533,30 @@
               <a:buChar char="•"/>
             </a:pPr>
             <a:r>
-              <a:rPr lang="en-US" altLang="ko-KR" sz="2000" b="1" dirty="0">
+              <a:rPr lang="en-US" altLang="ko-KR" b="1" dirty="0" smtClean="0">
                 <a:latin typeface="Arial" panose="020B0604020202020204" pitchFamily="34" charset="0"/>
                 <a:cs typeface="Arial" panose="020B0604020202020204" pitchFamily="34" charset="0"/>
               </a:rPr>
               <a:t>Outputs</a:t>
             </a:r>
+            <a:r>
+              <a:rPr lang="en-US" altLang="ko-KR" dirty="0">
+                <a:latin typeface="Arial" panose="020B0604020202020204" pitchFamily="34" charset="0"/>
+                <a:cs typeface="Arial" panose="020B0604020202020204" pitchFamily="34" charset="0"/>
+              </a:rPr>
+              <a:t>(ref. appendix.5 </a:t>
+            </a:r>
+            <a:r>
+              <a:rPr lang="en-US" altLang="ko-KR" dirty="0" smtClean="0">
+                <a:latin typeface="Arial" panose="020B0604020202020204" pitchFamily="34" charset="0"/>
+                <a:cs typeface="Arial" panose="020B0604020202020204" pitchFamily="34" charset="0"/>
+              </a:rPr>
+              <a:t>)</a:t>
+            </a:r>
+            <a:endParaRPr lang="en-US" altLang="ko-KR" b="1" dirty="0">
+              <a:latin typeface="Arial" panose="020B0604020202020204" pitchFamily="34" charset="0"/>
+              <a:cs typeface="Arial" panose="020B0604020202020204" pitchFamily="34" charset="0"/>
+            </a:endParaRPr>
           </a:p>
           <a:p>
             <a:pPr marL="742950" lvl="1" indent="-285750">
@@ -5687,12 +5567,37 @@
               <a:buChar char="ü"/>
             </a:pPr>
             <a:r>
-              <a:rPr lang="en-US" altLang="ko-KR" dirty="0">
-                <a:latin typeface="Arial" panose="020B0604020202020204" pitchFamily="34" charset="0"/>
-                <a:cs typeface="Arial" panose="020B0604020202020204" pitchFamily="34" charset="0"/>
-              </a:rPr>
-              <a:t>Test case : 11 (ref. appendix.5 )</a:t>
-            </a:r>
+              <a:rPr lang="en-US" altLang="ko-KR" sz="1600" dirty="0">
+                <a:latin typeface="Arial" panose="020B0604020202020204" pitchFamily="34" charset="0"/>
+                <a:cs typeface="Arial" panose="020B0604020202020204" pitchFamily="34" charset="0"/>
+              </a:rPr>
+              <a:t>Test case : </a:t>
+            </a:r>
+            <a:r>
+              <a:rPr lang="en-US" altLang="ko-KR" sz="1600" dirty="0" smtClean="0">
+                <a:latin typeface="Arial" panose="020B0604020202020204" pitchFamily="34" charset="0"/>
+                <a:cs typeface="Arial" panose="020B0604020202020204" pitchFamily="34" charset="0"/>
+              </a:rPr>
+              <a:t>17 (pass </a:t>
+            </a:r>
+            <a:r>
+              <a:rPr lang="en-US" altLang="ko-KR" sz="1600" dirty="0">
+                <a:latin typeface="Arial" panose="020B0604020202020204" pitchFamily="34" charset="0"/>
+                <a:cs typeface="Arial" panose="020B0604020202020204" pitchFamily="34" charset="0"/>
+              </a:rPr>
+              <a:t>rate </a:t>
+            </a:r>
+            <a:r>
+              <a:rPr lang="en-US" altLang="ko-KR" sz="1600" dirty="0" smtClean="0">
+                <a:latin typeface="Arial" panose="020B0604020202020204" pitchFamily="34" charset="0"/>
+                <a:cs typeface="Arial" panose="020B0604020202020204" pitchFamily="34" charset="0"/>
+              </a:rPr>
+              <a:t>100 %)</a:t>
+            </a:r>
+            <a:endParaRPr lang="en-US" altLang="ko-KR" sz="1600" dirty="0">
+              <a:latin typeface="Arial" panose="020B0604020202020204" pitchFamily="34" charset="0"/>
+              <a:cs typeface="Arial" panose="020B0604020202020204" pitchFamily="34" charset="0"/>
+            </a:endParaRPr>
           </a:p>
           <a:p>
             <a:pPr marL="742950" lvl="1" indent="-285750">
@@ -5703,11 +5608,38 @@
               <a:buChar char="ü"/>
             </a:pPr>
             <a:r>
-              <a:rPr lang="en-US" altLang="ko-KR" dirty="0">
-                <a:latin typeface="Arial" panose="020B0604020202020204" pitchFamily="34" charset="0"/>
-                <a:cs typeface="Arial" panose="020B0604020202020204" pitchFamily="34" charset="0"/>
-              </a:rPr>
-              <a:t>pass rate : : 100 %</a:t>
+              <a:rPr lang="en-US" altLang="ko-KR" sz="1600" dirty="0">
+                <a:latin typeface="Arial" panose="020B0604020202020204" pitchFamily="34" charset="0"/>
+                <a:cs typeface="Arial" panose="020B0604020202020204" pitchFamily="34" charset="0"/>
+              </a:rPr>
+              <a:t>Defect list : </a:t>
+            </a:r>
+            <a:r>
+              <a:rPr lang="en-US" altLang="ko-KR" sz="1600" dirty="0" smtClean="0">
+                <a:latin typeface="Arial" panose="020B0604020202020204" pitchFamily="34" charset="0"/>
+                <a:cs typeface="Arial" panose="020B0604020202020204" pitchFamily="34" charset="0"/>
+              </a:rPr>
+              <a:t>5 </a:t>
+            </a:r>
+            <a:endParaRPr lang="en-US" altLang="ko-KR" sz="1600" b="1" dirty="0" smtClean="0">
+              <a:latin typeface="Arial" panose="020B0604020202020204" pitchFamily="34" charset="0"/>
+              <a:cs typeface="Arial" panose="020B0604020202020204" pitchFamily="34" charset="0"/>
+            </a:endParaRPr>
+          </a:p>
+          <a:p>
+            <a:pPr marL="285750" indent="-285750">
+              <a:lnSpc>
+                <a:spcPct val="130000"/>
+              </a:lnSpc>
+              <a:buFont typeface="Arial" panose="020B0604020202020204" pitchFamily="34" charset="0"/>
+              <a:buChar char="•"/>
+            </a:pPr>
+            <a:r>
+              <a:rPr lang="en-US" altLang="ko-KR" b="1" dirty="0" smtClean="0">
+                <a:latin typeface="Arial" panose="020B0604020202020204" pitchFamily="34" charset="0"/>
+                <a:cs typeface="Arial" panose="020B0604020202020204" pitchFamily="34" charset="0"/>
+              </a:rPr>
+              <a:t>Lessons Learned  </a:t>
             </a:r>
           </a:p>
           <a:p>
@@ -5719,31 +5651,47 @@
               <a:buChar char="ü"/>
             </a:pPr>
             <a:r>
-              <a:rPr lang="en-US" altLang="ko-KR" dirty="0">
-                <a:latin typeface="Arial" panose="020B0604020202020204" pitchFamily="34" charset="0"/>
-                <a:cs typeface="Arial" panose="020B0604020202020204" pitchFamily="34" charset="0"/>
-              </a:rPr>
-              <a:t>Defect list : 1 (SDET-46) (appendix. 5)</a:t>
-            </a:r>
-            <a:endParaRPr lang="en-US" altLang="ko-KR" b="1" dirty="0">
-              <a:latin typeface="Arial" panose="020B0604020202020204" pitchFamily="34" charset="0"/>
-              <a:cs typeface="Arial" panose="020B0604020202020204" pitchFamily="34" charset="0"/>
-            </a:endParaRPr>
-          </a:p>
-          <a:p>
-            <a:pPr marL="285750" indent="-285750">
-              <a:lnSpc>
-                <a:spcPct val="130000"/>
-              </a:lnSpc>
-              <a:buFont typeface="Arial" panose="020B0604020202020204" pitchFamily="34" charset="0"/>
-              <a:buChar char="•"/>
-            </a:pPr>
-            <a:r>
-              <a:rPr lang="en-US" altLang="ko-KR" sz="2000" b="1" dirty="0">
-                <a:latin typeface="Arial" panose="020B0604020202020204" pitchFamily="34" charset="0"/>
-                <a:cs typeface="Arial" panose="020B0604020202020204" pitchFamily="34" charset="0"/>
-              </a:rPr>
-              <a:t>Lessons Learned  </a:t>
+              <a:rPr lang="en-US" altLang="ko-KR" sz="1400" dirty="0" smtClean="0">
+                <a:latin typeface="Arial" panose="020B0604020202020204" pitchFamily="34" charset="0"/>
+                <a:cs typeface="Arial" panose="020B0604020202020204" pitchFamily="34" charset="0"/>
+              </a:rPr>
+              <a:t>In </a:t>
+            </a:r>
+            <a:r>
+              <a:rPr lang="en-US" altLang="ko-KR" sz="1400" dirty="0">
+                <a:latin typeface="Arial" panose="020B0604020202020204" pitchFamily="34" charset="0"/>
+                <a:cs typeface="Arial" panose="020B0604020202020204" pitchFamily="34" charset="0"/>
+              </a:rPr>
+              <a:t>the tartan project, the modules are already integrated, should we do the integration test</a:t>
+            </a:r>
+            <a:r>
+              <a:rPr lang="en-US" altLang="ko-KR" sz="1400" dirty="0" smtClean="0">
+                <a:latin typeface="Arial" panose="020B0604020202020204" pitchFamily="34" charset="0"/>
+                <a:cs typeface="Arial" panose="020B0604020202020204" pitchFamily="34" charset="0"/>
+              </a:rPr>
+              <a:t>? </a:t>
+            </a:r>
+            <a:br>
+              <a:rPr lang="en-US" altLang="ko-KR" sz="1400" dirty="0" smtClean="0">
+                <a:latin typeface="Arial" panose="020B0604020202020204" pitchFamily="34" charset="0"/>
+                <a:cs typeface="Arial" panose="020B0604020202020204" pitchFamily="34" charset="0"/>
+              </a:rPr>
+            </a:br>
+            <a:r>
+              <a:rPr lang="en-US" altLang="ko-KR" sz="1400" dirty="0" smtClean="0">
+                <a:latin typeface="Arial" panose="020B0604020202020204" pitchFamily="34" charset="0"/>
+                <a:cs typeface="Arial" panose="020B0604020202020204" pitchFamily="34" charset="0"/>
+                <a:sym typeface="Wingdings" panose="05000000000000000000" pitchFamily="2" charset="2"/>
+              </a:rPr>
+              <a:t> </a:t>
+            </a:r>
+            <a:r>
+              <a:rPr lang="en-US" altLang="ko-KR" sz="1400" dirty="0"/>
+              <a:t>it is judged that there are no difference between system test and this integration </a:t>
+            </a:r>
+            <a:r>
+              <a:rPr lang="en-US" altLang="ko-KR" sz="1400" dirty="0" smtClean="0"/>
+              <a:t>test</a:t>
             </a:r>
           </a:p>
           <a:p>
@@ -5755,12 +5703,88 @@
               <a:buChar char="ü"/>
             </a:pPr>
             <a:r>
-              <a:rPr lang="en-US" altLang="ko-KR" dirty="0">
-                <a:latin typeface="Arial" panose="020B0604020202020204" pitchFamily="34" charset="0"/>
-                <a:cs typeface="Arial" panose="020B0604020202020204" pitchFamily="34" charset="0"/>
-              </a:rPr>
-              <a:t>In the tartan project, the modules are already integrated, should we do the integration test?</a:t>
-            </a:r>
+              <a:rPr lang="en-US" altLang="ko-KR" sz="1400" dirty="0">
+                <a:latin typeface="Arial" panose="020B0604020202020204" pitchFamily="34" charset="0"/>
+                <a:cs typeface="Arial" panose="020B0604020202020204" pitchFamily="34" charset="0"/>
+              </a:rPr>
+              <a:t>We could find many issues in the integration </a:t>
+            </a:r>
+            <a:r>
+              <a:rPr lang="en-US" altLang="ko-KR" sz="1400" dirty="0" smtClean="0">
+                <a:latin typeface="Arial" panose="020B0604020202020204" pitchFamily="34" charset="0"/>
+                <a:cs typeface="Arial" panose="020B0604020202020204" pitchFamily="34" charset="0"/>
+              </a:rPr>
+              <a:t>with </a:t>
+            </a:r>
+            <a:r>
+              <a:rPr lang="en-US" altLang="ko-KR" sz="1400" dirty="0">
+                <a:latin typeface="Arial" panose="020B0604020202020204" pitchFamily="34" charset="0"/>
+                <a:cs typeface="Arial" panose="020B0604020202020204" pitchFamily="34" charset="0"/>
+              </a:rPr>
+              <a:t>other functions</a:t>
+            </a:r>
+            <a:r>
+              <a:rPr lang="en-US" altLang="ko-KR" sz="1400" dirty="0" smtClean="0">
+                <a:latin typeface="Arial" panose="020B0604020202020204" pitchFamily="34" charset="0"/>
+                <a:cs typeface="Arial" panose="020B0604020202020204" pitchFamily="34" charset="0"/>
+              </a:rPr>
+              <a:t>. </a:t>
+            </a:r>
+            <a:br>
+              <a:rPr lang="en-US" altLang="ko-KR" sz="1400" dirty="0" smtClean="0">
+                <a:latin typeface="Arial" panose="020B0604020202020204" pitchFamily="34" charset="0"/>
+                <a:cs typeface="Arial" panose="020B0604020202020204" pitchFamily="34" charset="0"/>
+              </a:rPr>
+            </a:br>
+            <a:r>
+              <a:rPr lang="en-US" altLang="ko-KR" sz="1400" dirty="0">
+                <a:latin typeface="Arial" panose="020B0604020202020204" pitchFamily="34" charset="0"/>
+                <a:cs typeface="Arial" panose="020B0604020202020204" pitchFamily="34" charset="0"/>
+                <a:sym typeface="Wingdings" panose="05000000000000000000" pitchFamily="2" charset="2"/>
+              </a:rPr>
+              <a:t> For our team, we </a:t>
+            </a:r>
+            <a:r>
+              <a:rPr lang="en-US" altLang="ko-KR" sz="1400" dirty="0" smtClean="0">
+                <a:latin typeface="Arial" panose="020B0604020202020204" pitchFamily="34" charset="0"/>
+                <a:cs typeface="Arial" panose="020B0604020202020204" pitchFamily="34" charset="0"/>
+                <a:sym typeface="Wingdings" panose="05000000000000000000" pitchFamily="2" charset="2"/>
+              </a:rPr>
+              <a:t>used integration test more </a:t>
+            </a:r>
+            <a:r>
+              <a:rPr lang="en-US" altLang="ko-KR" sz="1400" dirty="0">
+                <a:latin typeface="Arial" panose="020B0604020202020204" pitchFamily="34" charset="0"/>
+                <a:cs typeface="Arial" panose="020B0604020202020204" pitchFamily="34" charset="0"/>
+                <a:sym typeface="Wingdings" panose="05000000000000000000" pitchFamily="2" charset="2"/>
+              </a:rPr>
+              <a:t>than unit </a:t>
+            </a:r>
+            <a:r>
+              <a:rPr lang="en-US" altLang="ko-KR" sz="1400" dirty="0" smtClean="0">
+                <a:latin typeface="Arial" panose="020B0604020202020204" pitchFamily="34" charset="0"/>
+                <a:cs typeface="Arial" panose="020B0604020202020204" pitchFamily="34" charset="0"/>
+                <a:sym typeface="Wingdings" panose="05000000000000000000" pitchFamily="2" charset="2"/>
+              </a:rPr>
+              <a:t>test.</a:t>
+            </a:r>
+            <a:endParaRPr lang="en-US" altLang="ko-KR" sz="1400" dirty="0" smtClean="0">
+              <a:latin typeface="Arial" panose="020B0604020202020204" pitchFamily="34" charset="0"/>
+              <a:cs typeface="Arial" panose="020B0604020202020204" pitchFamily="34" charset="0"/>
+            </a:endParaRPr>
+          </a:p>
+          <a:p>
+            <a:pPr marL="742950" lvl="1" indent="-285750">
+              <a:lnSpc>
+                <a:spcPct val="150000"/>
+              </a:lnSpc>
+              <a:buFont typeface="Wingdings" pitchFamily="2" charset="2"/>
+              <a:buChar char="ü"/>
+            </a:pPr>
+            <a:endParaRPr lang="en-US" altLang="ko-KR" sz="1600" dirty="0">
+              <a:latin typeface="Arial" panose="020B0604020202020204" pitchFamily="34" charset="0"/>
+              <a:cs typeface="Arial" panose="020B0604020202020204" pitchFamily="34" charset="0"/>
+            </a:endParaRPr>
           </a:p>
         </p:txBody>
       </p:sp>
@@ -5800,28 +5824,25 @@
                 <a:latin typeface="Arial" panose="020B0604020202020204" pitchFamily="34" charset="0"/>
                 <a:cs typeface="Arial" panose="020B0604020202020204" pitchFamily="34" charset="0"/>
               </a:rPr>
-              <a:t>Quality activity – Integration test</a:t>
-            </a:r>
-            <a:r>
-              <a:rPr lang="ko-KR" altLang="en-US" sz="2400" b="1" dirty="0">
+              <a:t>Quality activity – Integration </a:t>
+            </a:r>
+            <a:r>
+              <a:rPr lang="en-US" altLang="ko-KR" sz="2400" b="1" dirty="0" smtClean="0">
                 <a:solidFill>
                   <a:srgbClr val="FF0000"/>
                 </a:solidFill>
                 <a:latin typeface="Arial" panose="020B0604020202020204" pitchFamily="34" charset="0"/>
                 <a:cs typeface="Arial" panose="020B0604020202020204" pitchFamily="34" charset="0"/>
               </a:rPr>
-              <a:t> </a:t>
-            </a:r>
-            <a:r>
-              <a:rPr lang="en-US" altLang="ko-KR" sz="2400" b="1" dirty="0">
-                <a:solidFill>
-                  <a:srgbClr val="FF0000"/>
-                </a:solidFill>
-                <a:latin typeface="Arial" panose="020B0604020202020204" pitchFamily="34" charset="0"/>
-                <a:cs typeface="Arial" panose="020B0604020202020204" pitchFamily="34" charset="0"/>
-              </a:rPr>
-              <a:t>(To be edited)</a:t>
-            </a:r>
+              <a:t>test</a:t>
+            </a:r>
+            <a:endParaRPr lang="en-US" altLang="ko-KR" sz="2400" b="1" dirty="0">
+              <a:solidFill>
+                <a:srgbClr val="FF0000"/>
+              </a:solidFill>
+              <a:latin typeface="Arial" panose="020B0604020202020204" pitchFamily="34" charset="0"/>
+              <a:cs typeface="Arial" panose="020B0604020202020204" pitchFamily="34" charset="0"/>
+            </a:endParaRPr>
           </a:p>
         </p:txBody>
       </p:sp>
@@ -5861,217 +5882,6 @@
           </a:prstGeom>
         </p:spPr>
       </p:pic>
-      <p:sp>
-        <p:nvSpPr>
-          <p:cNvPr id="9" name="TextBox 8">
-            <a:extLst>
-              <a:ext uri="{FF2B5EF4-FFF2-40B4-BE49-F238E27FC236}">
-                <a16:creationId xmlns:a16="http://schemas.microsoft.com/office/drawing/2014/main" xmlns="" id="{ADBA57EB-F596-0F40-98BA-26FFE0909D0D}"/>
-              </a:ext>
-            </a:extLst>
-          </p:cNvPr>
-          <p:cNvSpPr txBox="1"/>
-          <p:nvPr/>
-        </p:nvSpPr>
-        <p:spPr>
-          <a:xfrm>
-            <a:off x="3169712" y="3284984"/>
-            <a:ext cx="5517088" cy="646331"/>
-          </a:xfrm>
-          <a:prstGeom prst="rect">
-            <a:avLst/>
-          </a:prstGeom>
-          <a:noFill/>
-        </p:spPr>
-        <p:txBody>
-          <a:bodyPr wrap="none" rtlCol="0">
-            <a:spAutoFit/>
-          </a:bodyPr>
-          <a:lstStyle/>
-          <a:p>
-            <a:pPr marL="285750" indent="-285750">
-              <a:buFontTx/>
-              <a:buChar char="-"/>
-            </a:pPr>
-            <a:r>
-              <a:rPr kumimoji="1" lang="en-US" altLang="ko-KR" dirty="0">
-                <a:solidFill>
-                  <a:srgbClr val="FF0000"/>
-                </a:solidFill>
-              </a:rPr>
-              <a:t>New feature </a:t>
-            </a:r>
-            <a:r>
-              <a:rPr kumimoji="1" lang="ko-KR" altLang="en-US" dirty="0">
-                <a:solidFill>
-                  <a:srgbClr val="FF0000"/>
-                </a:solidFill>
-              </a:rPr>
-              <a:t>내용 위주로 재구성</a:t>
-            </a:r>
-            <a:endParaRPr kumimoji="1" lang="en-US" altLang="ko-KR" dirty="0">
-              <a:solidFill>
-                <a:srgbClr val="FF0000"/>
-              </a:solidFill>
-            </a:endParaRPr>
-          </a:p>
-          <a:p>
-            <a:pPr marL="285750" indent="-285750">
-              <a:buFontTx/>
-              <a:buChar char="-"/>
-            </a:pPr>
-            <a:r>
-              <a:rPr kumimoji="1" lang="ko-KR" altLang="en-US" dirty="0">
-                <a:solidFill>
-                  <a:srgbClr val="FF0000"/>
-                </a:solidFill>
-              </a:rPr>
-              <a:t>기존 내용은 </a:t>
-            </a:r>
-            <a:r>
-              <a:rPr kumimoji="1" lang="en-US" altLang="ko-KR" dirty="0">
-                <a:solidFill>
-                  <a:srgbClr val="FF0000"/>
-                </a:solidFill>
-              </a:rPr>
-              <a:t>effort. </a:t>
-            </a:r>
-            <a:r>
-              <a:rPr kumimoji="1" lang="ko-KR" altLang="en-US" dirty="0">
-                <a:solidFill>
-                  <a:srgbClr val="FF0000"/>
-                </a:solidFill>
-              </a:rPr>
-              <a:t>관련된 데이터 위주로 재사용</a:t>
-            </a:r>
-            <a:endParaRPr kumimoji="1" lang="en-US" altLang="ko-KR" dirty="0">
-              <a:solidFill>
-                <a:srgbClr val="FF0000"/>
-              </a:solidFill>
-            </a:endParaRPr>
-          </a:p>
-        </p:txBody>
-      </p:sp>
-      <p:sp>
-        <p:nvSpPr>
-          <p:cNvPr id="10" name="TextBox 9">
-            <a:extLst>
-              <a:ext uri="{FF2B5EF4-FFF2-40B4-BE49-F238E27FC236}">
-                <a16:creationId xmlns:a16="http://schemas.microsoft.com/office/drawing/2014/main" xmlns="" id="{13B2E287-0F97-0C49-84B9-63FCDC0A1D94}"/>
-              </a:ext>
-            </a:extLst>
-          </p:cNvPr>
-          <p:cNvSpPr txBox="1"/>
-          <p:nvPr/>
-        </p:nvSpPr>
-        <p:spPr>
-          <a:xfrm>
-            <a:off x="7127811" y="250419"/>
-            <a:ext cx="540533" cy="369332"/>
-          </a:xfrm>
-          <a:prstGeom prst="rect">
-            <a:avLst/>
-          </a:prstGeom>
-          <a:noFill/>
-        </p:spPr>
-        <p:txBody>
-          <a:bodyPr wrap="none" rtlCol="0">
-            <a:spAutoFit/>
-          </a:bodyPr>
-          <a:lstStyle/>
-          <a:p>
-            <a:r>
-              <a:rPr kumimoji="1" lang="ko-KR" altLang="en-US" dirty="0">
-                <a:solidFill>
-                  <a:srgbClr val="FF0000"/>
-                </a:solidFill>
-              </a:rPr>
-              <a:t>황</a:t>
-            </a:r>
-            <a:r>
-              <a:rPr kumimoji="1" lang="en-US" altLang="ko-KR" dirty="0">
-                <a:solidFill>
-                  <a:srgbClr val="FF0000"/>
-                </a:solidFill>
-              </a:rPr>
-              <a:t>S</a:t>
-            </a:r>
-            <a:endParaRPr kumimoji="1" lang="ko-KR" altLang="en-US" dirty="0">
-              <a:solidFill>
-                <a:srgbClr val="FF0000"/>
-              </a:solidFill>
-            </a:endParaRPr>
-          </a:p>
-        </p:txBody>
-      </p:sp>
-      <p:sp>
-        <p:nvSpPr>
-          <p:cNvPr id="11" name="TextBox 10">
-            <a:extLst>
-              <a:ext uri="{FF2B5EF4-FFF2-40B4-BE49-F238E27FC236}">
-                <a16:creationId xmlns:a16="http://schemas.microsoft.com/office/drawing/2014/main" xmlns="" id="{C6A3F71E-6209-2E46-B362-99AAD0BA4207}"/>
-              </a:ext>
-            </a:extLst>
-          </p:cNvPr>
-          <p:cNvSpPr txBox="1"/>
-          <p:nvPr/>
-        </p:nvSpPr>
-        <p:spPr>
-          <a:xfrm>
-            <a:off x="5217570" y="1556792"/>
-            <a:ext cx="3820481" cy="584775"/>
-          </a:xfrm>
-          <a:prstGeom prst="rect">
-            <a:avLst/>
-          </a:prstGeom>
-          <a:noFill/>
-        </p:spPr>
-        <p:txBody>
-          <a:bodyPr wrap="square" rtlCol="0">
-            <a:spAutoFit/>
-          </a:bodyPr>
-          <a:lstStyle/>
-          <a:p>
-            <a:r>
-              <a:rPr kumimoji="1" lang="en-US" altLang="ko-KR" sz="1600" b="1" dirty="0" smtClean="0">
-                <a:solidFill>
-                  <a:srgbClr val="0070C0"/>
-                </a:solidFill>
-              </a:rPr>
-              <a:t>New feature integration test case </a:t>
-            </a:r>
-            <a:r>
-              <a:rPr kumimoji="1" lang="ko-KR" altLang="en-US" sz="1600" b="1" dirty="0" smtClean="0">
-                <a:solidFill>
-                  <a:srgbClr val="0070C0"/>
-                </a:solidFill>
-              </a:rPr>
-              <a:t>및 </a:t>
-            </a:r>
-            <a:r>
-              <a:rPr kumimoji="1" lang="en-US" altLang="ko-KR" sz="1600" b="1" dirty="0" smtClean="0">
-                <a:solidFill>
-                  <a:srgbClr val="0070C0"/>
-                </a:solidFill>
-              </a:rPr>
-              <a:t>defect </a:t>
-            </a:r>
-            <a:r>
-              <a:rPr kumimoji="1" lang="ko-KR" altLang="en-US" sz="1600" b="1" dirty="0" smtClean="0">
-                <a:solidFill>
-                  <a:srgbClr val="0070C0"/>
-                </a:solidFill>
-              </a:rPr>
-              <a:t>기준으로 수정</a:t>
-            </a:r>
-            <a:endParaRPr kumimoji="1" lang="en-US" altLang="ko-KR" sz="1600" b="1" dirty="0" smtClean="0">
-              <a:solidFill>
-                <a:srgbClr val="0070C0"/>
-              </a:solidFill>
-            </a:endParaRPr>
-          </a:p>
-        </p:txBody>
-      </p:sp>
     </p:spTree>
     <p:extLst>
       <p:ext uri="{BB962C8B-B14F-4D97-AF65-F5344CB8AC3E}">
@@ -6566,7 +6376,7 @@
         <p:spPr>
           <a:xfrm>
             <a:off x="323528" y="187319"/>
-            <a:ext cx="7560840" cy="461665"/>
+            <a:ext cx="7488832" cy="461665"/>
           </a:xfrm>
           <a:prstGeom prst="rect">
             <a:avLst/>
@@ -6580,23 +6390,10 @@
           <a:lstStyle/>
           <a:p>
             <a:r>
-              <a:rPr lang="en-US" altLang="ko-KR" sz="2400" b="1" dirty="0">
-                <a:latin typeface="Arial" panose="020B0604020202020204" pitchFamily="34" charset="0"/>
-                <a:cs typeface="Arial" panose="020B0604020202020204" pitchFamily="34" charset="0"/>
-              </a:rPr>
-              <a:t>Appendix 4. Quality activity – </a:t>
-            </a:r>
-            <a:r>
-              <a:rPr lang="en-US" altLang="ko-KR" sz="2400" b="1" dirty="0" smtClean="0">
-                <a:latin typeface="Arial" panose="020B0604020202020204" pitchFamily="34" charset="0"/>
-                <a:cs typeface="Arial" panose="020B0604020202020204" pitchFamily="34" charset="0"/>
-              </a:rPr>
-              <a:t>Mutation Test</a:t>
-            </a:r>
-            <a:endParaRPr lang="ko-KR" altLang="en-US" sz="2400" b="1" dirty="0">
-              <a:latin typeface="Arial" panose="020B0604020202020204" pitchFamily="34" charset="0"/>
-              <a:cs typeface="Arial" panose="020B0604020202020204" pitchFamily="34" charset="0"/>
-            </a:endParaRPr>
+              <a:rPr lang="en-US" altLang="ko-KR" sz="2400" b="1" dirty="0"/>
+              <a:t>Appendix 5. Quality activity – Integration test</a:t>
+            </a:r>
+            <a:endParaRPr lang="ko-KR" altLang="en-US" sz="2400" b="1" dirty="0"/>
           </a:p>
         </p:txBody>
       </p:sp>
@@ -6644,8 +6441,8 @@
         </p:nvSpPr>
         <p:spPr>
           <a:xfrm>
-            <a:off x="293680" y="620688"/>
-            <a:ext cx="3475888" cy="452432"/>
+            <a:off x="35496" y="548680"/>
+            <a:ext cx="1542089" cy="412742"/>
           </a:xfrm>
           <a:prstGeom prst="rect">
             <a:avLst/>
@@ -6665,10 +6462,9 @@
               <a:buChar char="•"/>
             </a:pPr>
             <a:r>
-              <a:rPr lang="en-US" altLang="ko-KR" b="1" dirty="0" smtClean="0"/>
-              <a:t>affected Unit Test Case List</a:t>
-            </a:r>
-            <a:endParaRPr lang="en-US" altLang="ko-KR" b="1" dirty="0"/>
+              <a:rPr lang="en-US" altLang="ko-KR" b="1" dirty="0"/>
+              <a:t>Test case </a:t>
+            </a:r>
           </a:p>
         </p:txBody>
       </p:sp>
@@ -6688,8 +6484,8 @@
         </p:blipFill>
         <p:spPr>
           <a:xfrm>
-            <a:off x="293680" y="1225557"/>
-            <a:ext cx="4641764" cy="5593056"/>
+            <a:off x="0" y="908720"/>
+            <a:ext cx="9144000" cy="2177466"/>
           </a:xfrm>
           <a:prstGeom prst="rect">
             <a:avLst/>
@@ -6712,8 +6508,8 @@
         </p:blipFill>
         <p:spPr>
           <a:xfrm>
-            <a:off x="5148064" y="1268760"/>
-            <a:ext cx="1733550" cy="361950"/>
+            <a:off x="53752" y="3068960"/>
+            <a:ext cx="9036496" cy="2853977"/>
           </a:xfrm>
           <a:prstGeom prst="rect">
             <a:avLst/>
@@ -6722,7 +6518,7 @@
       </p:pic>
       <p:pic>
         <p:nvPicPr>
-          <p:cNvPr id="14" name="그림 13"/>
+          <p:cNvPr id="4" name="그림 3"/>
           <p:cNvPicPr>
             <a:picLocks noChangeAspect="1"/>
           </p:cNvPicPr>
@@ -6736,468 +6532,14 @@
         </p:blipFill>
         <p:spPr>
           <a:xfrm>
-            <a:off x="5186511" y="3402310"/>
-            <a:ext cx="1743075" cy="161925"/>
+            <a:off x="70776" y="5726486"/>
+            <a:ext cx="7741583" cy="1029851"/>
           </a:xfrm>
           <a:prstGeom prst="rect">
             <a:avLst/>
           </a:prstGeom>
         </p:spPr>
       </p:pic>
-      <p:pic>
-        <p:nvPicPr>
-          <p:cNvPr id="19" name="그림 18"/>
-          <p:cNvPicPr>
-            <a:picLocks noChangeAspect="1"/>
-          </p:cNvPicPr>
-          <p:nvPr/>
-        </p:nvPicPr>
-        <p:blipFill>
-          <a:blip r:embed="rId7"/>
-          <a:stretch>
-            <a:fillRect/>
-          </a:stretch>
-        </p:blipFill>
-        <p:spPr>
-          <a:xfrm>
-            <a:off x="5186511" y="2878435"/>
-            <a:ext cx="2409825" cy="523875"/>
-          </a:xfrm>
-          <a:prstGeom prst="rect">
-            <a:avLst/>
-          </a:prstGeom>
-        </p:spPr>
-      </p:pic>
-      <p:pic>
-        <p:nvPicPr>
-          <p:cNvPr id="20" name="그림 19"/>
-          <p:cNvPicPr>
-            <a:picLocks noChangeAspect="1"/>
-          </p:cNvPicPr>
-          <p:nvPr/>
-        </p:nvPicPr>
-        <p:blipFill>
-          <a:blip r:embed="rId8"/>
-          <a:stretch>
-            <a:fillRect/>
-          </a:stretch>
-        </p:blipFill>
-        <p:spPr>
-          <a:xfrm>
-            <a:off x="5186511" y="1630710"/>
-            <a:ext cx="2114550" cy="190500"/>
-          </a:xfrm>
-          <a:prstGeom prst="rect">
-            <a:avLst/>
-          </a:prstGeom>
-        </p:spPr>
-      </p:pic>
-      <p:sp>
-        <p:nvSpPr>
-          <p:cNvPr id="21" name="TextBox 20"/>
-          <p:cNvSpPr txBox="1"/>
-          <p:nvPr/>
-        </p:nvSpPr>
-        <p:spPr>
-          <a:xfrm>
-            <a:off x="353561" y="897687"/>
-            <a:ext cx="1194494" cy="369332"/>
-          </a:xfrm>
-          <a:prstGeom prst="rect">
-            <a:avLst/>
-          </a:prstGeom>
-          <a:noFill/>
-        </p:spPr>
-        <p:txBody>
-          <a:bodyPr wrap="none" rtlCol="0">
-            <a:spAutoFit/>
-          </a:bodyPr>
-          <a:lstStyle/>
-          <a:p>
-            <a:r>
-              <a:rPr lang="en-US" altLang="ko-KR" dirty="0" err="1" smtClean="0"/>
-              <a:t>GameTest</a:t>
-            </a:r>
-            <a:endParaRPr lang="ko-KR" altLang="en-US"/>
-          </a:p>
-        </p:txBody>
-      </p:sp>
-      <p:sp>
-        <p:nvSpPr>
-          <p:cNvPr id="22" name="TextBox 21"/>
-          <p:cNvSpPr txBox="1"/>
-          <p:nvPr/>
-        </p:nvSpPr>
-        <p:spPr>
-          <a:xfrm>
-            <a:off x="5194467" y="888454"/>
-            <a:ext cx="1053109" cy="369332"/>
-          </a:xfrm>
-          <a:prstGeom prst="rect">
-            <a:avLst/>
-          </a:prstGeom>
-          <a:noFill/>
-        </p:spPr>
-        <p:txBody>
-          <a:bodyPr wrap="none" rtlCol="0">
-            <a:spAutoFit/>
-          </a:bodyPr>
-          <a:lstStyle/>
-          <a:p>
-            <a:r>
-              <a:rPr lang="en-US" altLang="ko-KR" dirty="0" err="1" smtClean="0"/>
-              <a:t>ItemTest</a:t>
-            </a:r>
-            <a:endParaRPr lang="ko-KR" altLang="en-US"/>
-          </a:p>
-        </p:txBody>
-      </p:sp>
-      <p:sp>
-        <p:nvSpPr>
-          <p:cNvPr id="23" name="TextBox 22"/>
-          <p:cNvSpPr txBox="1"/>
-          <p:nvPr/>
-        </p:nvSpPr>
-        <p:spPr>
-          <a:xfrm>
-            <a:off x="5186511" y="2509103"/>
-            <a:ext cx="1292662" cy="369332"/>
-          </a:xfrm>
-          <a:prstGeom prst="rect">
-            <a:avLst/>
-          </a:prstGeom>
-          <a:noFill/>
-        </p:spPr>
-        <p:txBody>
-          <a:bodyPr wrap="none" rtlCol="0">
-            <a:spAutoFit/>
-          </a:bodyPr>
-          <a:lstStyle/>
-          <a:p>
-            <a:r>
-              <a:rPr lang="en-US" altLang="ko-KR" dirty="0" smtClean="0"/>
-              <a:t>Player Test</a:t>
-            </a:r>
-            <a:endParaRPr lang="ko-KR" altLang="en-US"/>
-          </a:p>
-        </p:txBody>
-      </p:sp>
-    </p:spTree>
-    <p:extLst>
-      <p:ext uri="{BB962C8B-B14F-4D97-AF65-F5344CB8AC3E}">
-        <p14:creationId xmlns:p14="http://schemas.microsoft.com/office/powerpoint/2010/main" val="2317803677"/>
-      </p:ext>
-    </p:extLst>
-  </p:cSld>
-  <p:clrMapOvr>
-    <a:masterClrMapping/>
-  </p:clrMapOvr>
-  <p:timing>
-    <p:tnLst>
-      <p:par>
-        <p:cTn id="1" dur="indefinite" restart="never" nodeType="tmRoot"/>
-      </p:par>
-    </p:tnLst>
-  </p:timing>
-</p:sld>
-</file>
-
-<file path=ppt/slides/slide7.xml><?xml version="1.0" encoding="utf-8"?>
-<p:sld xmlns:a="http://schemas.openxmlformats.org/drawingml/2006/main" xmlns:r="http://schemas.openxmlformats.org/officeDocument/2006/relationships" xmlns:p="http://schemas.openxmlformats.org/presentationml/2006/main">
-  <p:cSld>
-    <p:spTree>
-      <p:nvGrpSpPr>
-        <p:cNvPr id="1" name=""/>
-        <p:cNvGrpSpPr/>
-        <p:nvPr/>
-      </p:nvGrpSpPr>
-      <p:grpSpPr>
-        <a:xfrm>
-          <a:off x="0" y="0"/>
-          <a:ext cx="0" cy="0"/>
-          <a:chOff x="0" y="0"/>
-          <a:chExt cx="0" cy="0"/>
-        </a:xfrm>
-      </p:grpSpPr>
-      <p:sp>
-        <p:nvSpPr>
-          <p:cNvPr id="5" name="슬라이드 번호 개체 틀 4">
-            <a:extLst>
-              <a:ext uri="{FF2B5EF4-FFF2-40B4-BE49-F238E27FC236}">
-                <a16:creationId xmlns:a16="http://schemas.microsoft.com/office/drawing/2014/main" xmlns="" id="{9FA75F19-B7A8-6A4F-A5D3-84D9FFF88627}"/>
-              </a:ext>
-            </a:extLst>
-          </p:cNvPr>
-          <p:cNvSpPr>
-            <a:spLocks noGrp="1"/>
-          </p:cNvSpPr>
-          <p:nvPr>
-            <p:ph type="sldNum" sz="quarter" idx="12"/>
-          </p:nvPr>
-        </p:nvSpPr>
-        <p:spPr/>
-        <p:txBody>
-          <a:bodyPr/>
-          <a:lstStyle/>
-          <a:p>
-            <a:fld id="{80E8D238-1282-4047-ADCD-348209F756B1}" type="slidenum">
-              <a:rPr lang="ko-KR" altLang="en-US" sz="1400" b="1" smtClean="0"/>
-              <a:t>7</a:t>
-            </a:fld>
-            <a:endParaRPr lang="ko-KR" altLang="en-US" sz="1400" b="1" dirty="0"/>
-          </a:p>
-        </p:txBody>
-      </p:sp>
-      <p:sp>
-        <p:nvSpPr>
-          <p:cNvPr id="7" name="TextBox 6">
-            <a:extLst>
-              <a:ext uri="{FF2B5EF4-FFF2-40B4-BE49-F238E27FC236}">
-                <a16:creationId xmlns:a16="http://schemas.microsoft.com/office/drawing/2014/main" xmlns="" id="{B4B1FE1F-6CD7-654F-8F56-C2F661931D17}"/>
-              </a:ext>
-            </a:extLst>
-          </p:cNvPr>
-          <p:cNvSpPr txBox="1"/>
-          <p:nvPr/>
-        </p:nvSpPr>
-        <p:spPr>
-          <a:xfrm>
-            <a:off x="323528" y="187319"/>
-            <a:ext cx="7488832" cy="461665"/>
-          </a:xfrm>
-          <a:prstGeom prst="rect">
-            <a:avLst/>
-          </a:prstGeom>
-          <a:noFill/>
-        </p:spPr>
-        <p:txBody>
-          <a:bodyPr wrap="square" rtlCol="0">
-            <a:spAutoFit/>
-          </a:bodyPr>
-          <a:lstStyle/>
-          <a:p>
-            <a:r>
-              <a:rPr lang="en-US" altLang="ko-KR" sz="2400" b="1" dirty="0"/>
-              <a:t>Appendix 5. Quality activity – Integration test</a:t>
-            </a:r>
-            <a:endParaRPr lang="ko-KR" altLang="en-US" sz="2400" b="1" dirty="0"/>
-          </a:p>
-        </p:txBody>
-      </p:sp>
-      <p:pic>
-        <p:nvPicPr>
-          <p:cNvPr id="8" name="그림 7">
-            <a:extLst>
-              <a:ext uri="{FF2B5EF4-FFF2-40B4-BE49-F238E27FC236}">
-                <a16:creationId xmlns:a16="http://schemas.microsoft.com/office/drawing/2014/main" xmlns="" id="{434B5C57-8B8B-1A4A-B338-3D39BA11B5B9}"/>
-              </a:ext>
-            </a:extLst>
-          </p:cNvPr>
-          <p:cNvPicPr>
-            <a:picLocks noChangeAspect="1"/>
-          </p:cNvPicPr>
-          <p:nvPr/>
-        </p:nvPicPr>
-        <p:blipFill>
-          <a:blip r:embed="rId3" cstate="print">
-            <a:extLst>
-              <a:ext uri="{28A0092B-C50C-407E-A947-70E740481C1C}">
-                <a14:useLocalDpi xmlns:a14="http://schemas.microsoft.com/office/drawing/2010/main" val="0"/>
-              </a:ext>
-            </a:extLst>
-          </a:blip>
-          <a:stretch>
-            <a:fillRect/>
-          </a:stretch>
-        </p:blipFill>
-        <p:spPr>
-          <a:xfrm>
-            <a:off x="7705687" y="187319"/>
-            <a:ext cx="1047328" cy="584802"/>
-          </a:xfrm>
-          <a:prstGeom prst="rect">
-            <a:avLst/>
-          </a:prstGeom>
-        </p:spPr>
-      </p:pic>
-      <p:pic>
-        <p:nvPicPr>
-          <p:cNvPr id="3074" name="Picture 2"/>
-          <p:cNvPicPr>
-            <a:picLocks noChangeAspect="1" noChangeArrowheads="1"/>
-          </p:cNvPicPr>
-          <p:nvPr/>
-        </p:nvPicPr>
-        <p:blipFill>
-          <a:blip r:embed="rId4">
-            <a:extLst>
-              <a:ext uri="{28A0092B-C50C-407E-A947-70E740481C1C}">
-                <a14:useLocalDpi xmlns:a14="http://schemas.microsoft.com/office/drawing/2010/main" val="0"/>
-              </a:ext>
-            </a:extLst>
-          </a:blip>
-          <a:srcRect/>
-          <a:stretch>
-            <a:fillRect/>
-          </a:stretch>
-        </p:blipFill>
-        <p:spPr bwMode="auto">
-          <a:xfrm>
-            <a:off x="4882156" y="1502462"/>
-            <a:ext cx="3650284" cy="630394"/>
-          </a:xfrm>
-          <a:prstGeom prst="rect">
-            <a:avLst/>
-          </a:prstGeom>
-          <a:noFill/>
-          <a:ln>
-            <a:noFill/>
-          </a:ln>
-          <a:extLst>
-            <a:ext uri="{909E8E84-426E-40DD-AFC4-6F175D3DCCD1}">
-              <a14:hiddenFill xmlns:a14="http://schemas.microsoft.com/office/drawing/2010/main">
-                <a:solidFill>
-                  <a:schemeClr val="accent1"/>
-                </a:solidFill>
-              </a14:hiddenFill>
-            </a:ext>
-            <a:ext uri="{91240B29-F687-4F45-9708-019B960494DF}">
-              <a14:hiddenLine xmlns:a14="http://schemas.microsoft.com/office/drawing/2010/main" w="9525">
-                <a:solidFill>
-                  <a:schemeClr val="tx1"/>
-                </a:solidFill>
-                <a:miter lim="800000"/>
-                <a:headEnd/>
-                <a:tailEnd/>
-              </a14:hiddenLine>
-            </a:ext>
-          </a:extLst>
-        </p:spPr>
-      </p:pic>
-      <p:pic>
-        <p:nvPicPr>
-          <p:cNvPr id="2050" name="Picture 2"/>
-          <p:cNvPicPr>
-            <a:picLocks noChangeAspect="1" noChangeArrowheads="1"/>
-          </p:cNvPicPr>
-          <p:nvPr/>
-        </p:nvPicPr>
-        <p:blipFill>
-          <a:blip r:embed="rId5">
-            <a:extLst>
-              <a:ext uri="{28A0092B-C50C-407E-A947-70E740481C1C}">
-                <a14:useLocalDpi xmlns:a14="http://schemas.microsoft.com/office/drawing/2010/main" val="0"/>
-              </a:ext>
-            </a:extLst>
-          </a:blip>
-          <a:srcRect/>
-          <a:stretch>
-            <a:fillRect/>
-          </a:stretch>
-        </p:blipFill>
-        <p:spPr bwMode="auto">
-          <a:xfrm>
-            <a:off x="356122" y="1484785"/>
-            <a:ext cx="4167144" cy="4032448"/>
-          </a:xfrm>
-          <a:prstGeom prst="rect">
-            <a:avLst/>
-          </a:prstGeom>
-          <a:noFill/>
-          <a:ln>
-            <a:noFill/>
-          </a:ln>
-          <a:extLst>
-            <a:ext uri="{909E8E84-426E-40DD-AFC4-6F175D3DCCD1}">
-              <a14:hiddenFill xmlns:a14="http://schemas.microsoft.com/office/drawing/2010/main">
-                <a:solidFill>
-                  <a:schemeClr val="accent1"/>
-                </a:solidFill>
-              </a14:hiddenFill>
-            </a:ext>
-            <a:ext uri="{91240B29-F687-4F45-9708-019B960494DF}">
-              <a14:hiddenLine xmlns:a14="http://schemas.microsoft.com/office/drawing/2010/main" w="9525">
-                <a:solidFill>
-                  <a:schemeClr val="tx1"/>
-                </a:solidFill>
-                <a:miter lim="800000"/>
-                <a:headEnd/>
-                <a:tailEnd/>
-              </a14:hiddenLine>
-            </a:ext>
-          </a:extLst>
-        </p:spPr>
-      </p:pic>
-      <p:sp>
-        <p:nvSpPr>
-          <p:cNvPr id="9" name="직사각형 8"/>
-          <p:cNvSpPr/>
-          <p:nvPr/>
-        </p:nvSpPr>
-        <p:spPr>
-          <a:xfrm>
-            <a:off x="293680" y="893483"/>
-            <a:ext cx="1542089" cy="412742"/>
-          </a:xfrm>
-          <a:prstGeom prst="rect">
-            <a:avLst/>
-          </a:prstGeom>
-        </p:spPr>
-        <p:txBody>
-          <a:bodyPr wrap="none">
-            <a:spAutoFit/>
-          </a:bodyPr>
-          <a:lstStyle/>
-          <a:p>
-            <a:pPr marL="285750" indent="-285750">
-              <a:lnSpc>
-                <a:spcPct val="130000"/>
-              </a:lnSpc>
-              <a:buFont typeface="Arial" panose="020B0604020202020204" pitchFamily="34" charset="0"/>
-              <a:buChar char="•"/>
-            </a:pPr>
-            <a:r>
-              <a:rPr lang="en-US" altLang="ko-KR" b="1" dirty="0"/>
-              <a:t>Test case </a:t>
-            </a:r>
-          </a:p>
-        </p:txBody>
-      </p:sp>
-      <p:sp>
-        <p:nvSpPr>
-          <p:cNvPr id="10" name="직사각형 9"/>
-          <p:cNvSpPr/>
-          <p:nvPr/>
-        </p:nvSpPr>
-        <p:spPr>
-          <a:xfrm>
-            <a:off x="4712749" y="892276"/>
-            <a:ext cx="1590500" cy="412742"/>
-          </a:xfrm>
-          <a:prstGeom prst="rect">
-            <a:avLst/>
-          </a:prstGeom>
-        </p:spPr>
-        <p:txBody>
-          <a:bodyPr wrap="none">
-            <a:spAutoFit/>
-          </a:bodyPr>
-          <a:lstStyle/>
-          <a:p>
-            <a:pPr marL="285750" indent="-285750">
-              <a:lnSpc>
-                <a:spcPct val="130000"/>
-              </a:lnSpc>
-              <a:buFont typeface="Arial" panose="020B0604020202020204" pitchFamily="34" charset="0"/>
-              <a:buChar char="•"/>
-            </a:pPr>
-            <a:r>
-              <a:rPr lang="en-US" altLang="ko-KR" b="1" dirty="0"/>
-              <a:t>Defect list</a:t>
-            </a:r>
-          </a:p>
-        </p:txBody>
-      </p:sp>
     </p:spTree>
     <p:extLst>
       <p:ext uri="{BB962C8B-B14F-4D97-AF65-F5344CB8AC3E}">

</xml_diff>

<commit_message>
defect add for integration
</commit_message>
<xml_diff>
--- a/bts_final-presentaion_0801_draft3_HY.pptx
+++ b/bts_final-presentaion_0801_draft3_HY.pptx
@@ -3856,7 +3856,7 @@
           <p:cNvPr id="16" name="그림 15">
             <a:extLst>
               <a:ext uri="{FF2B5EF4-FFF2-40B4-BE49-F238E27FC236}">
-                <a16:creationId xmlns:a16="http://schemas.microsoft.com/office/drawing/2014/main" xmlns="" id="{08326906-BADA-D546-B5EB-0B3FD0E33788}"/>
+                <a16:creationId xmlns="" xmlns:a16="http://schemas.microsoft.com/office/drawing/2014/main" id="{08326906-BADA-D546-B5EB-0B3FD0E33788}"/>
               </a:ext>
             </a:extLst>
           </p:cNvPr>
@@ -3892,7 +3892,7 @@
           <p:cNvPr id="7" name="AutoShape 2" descr="https://sdet-bts.atlassian.net/wiki/download/thumbnails/196610/IMG-7052.JPG?version=1&amp;modificationDate=1531539508835&amp;cacheVersion=1&amp;api=v2&amp;width=100">
             <a:extLst>
               <a:ext uri="{FF2B5EF4-FFF2-40B4-BE49-F238E27FC236}">
-                <a16:creationId xmlns:a16="http://schemas.microsoft.com/office/drawing/2014/main" xmlns="" id="{3E3EB99E-BC9F-8649-BC00-DD719F02A210}"/>
+                <a16:creationId xmlns="" xmlns:a16="http://schemas.microsoft.com/office/drawing/2014/main" id="{3E3EB99E-BC9F-8649-BC00-DD719F02A210}"/>
               </a:ext>
             </a:extLst>
           </p:cNvPr>
@@ -3937,7 +3937,7 @@
           <p:cNvPr id="9" name="AutoShape 3" descr="https://sdet-bts.atlassian.net/wiki/download/thumbnails/196610/IMG-7056.JPG?version=1&amp;modificationDate=1531539497859&amp;cacheVersion=1&amp;api=v2&amp;width=100">
             <a:extLst>
               <a:ext uri="{FF2B5EF4-FFF2-40B4-BE49-F238E27FC236}">
-                <a16:creationId xmlns:a16="http://schemas.microsoft.com/office/drawing/2014/main" xmlns="" id="{3DDF5B4F-EB0C-8645-B31C-EB08F27A637E}"/>
+                <a16:creationId xmlns="" xmlns:a16="http://schemas.microsoft.com/office/drawing/2014/main" id="{3DDF5B4F-EB0C-8645-B31C-EB08F27A637E}"/>
               </a:ext>
             </a:extLst>
           </p:cNvPr>
@@ -3982,7 +3982,7 @@
           <p:cNvPr id="15" name="TextBox 14">
             <a:extLst>
               <a:ext uri="{FF2B5EF4-FFF2-40B4-BE49-F238E27FC236}">
-                <a16:creationId xmlns:a16="http://schemas.microsoft.com/office/drawing/2014/main" xmlns="" id="{A046B8AF-E701-F948-80F0-187808BB4ED5}"/>
+                <a16:creationId xmlns="" xmlns:a16="http://schemas.microsoft.com/office/drawing/2014/main" id="{A046B8AF-E701-F948-80F0-187808BB4ED5}"/>
               </a:ext>
             </a:extLst>
           </p:cNvPr>
@@ -4056,7 +4056,7 @@
           <p:cNvPr id="5" name="슬라이드 번호 개체 틀 4">
             <a:extLst>
               <a:ext uri="{FF2B5EF4-FFF2-40B4-BE49-F238E27FC236}">
-                <a16:creationId xmlns:a16="http://schemas.microsoft.com/office/drawing/2014/main" xmlns="" id="{9FA75F19-B7A8-6A4F-A5D3-84D9FFF88627}"/>
+                <a16:creationId xmlns="" xmlns:a16="http://schemas.microsoft.com/office/drawing/2014/main" id="{9FA75F19-B7A8-6A4F-A5D3-84D9FFF88627}"/>
               </a:ext>
             </a:extLst>
           </p:cNvPr>
@@ -4085,7 +4085,7 @@
           <p:cNvPr id="6" name="TextBox 5">
             <a:extLst>
               <a:ext uri="{FF2B5EF4-FFF2-40B4-BE49-F238E27FC236}">
-                <a16:creationId xmlns:a16="http://schemas.microsoft.com/office/drawing/2014/main" xmlns="" id="{255C3C49-883C-204B-8A2C-B220C66630BD}"/>
+                <a16:creationId xmlns="" xmlns:a16="http://schemas.microsoft.com/office/drawing/2014/main" id="{255C3C49-883C-204B-8A2C-B220C66630BD}"/>
               </a:ext>
             </a:extLst>
           </p:cNvPr>
@@ -4547,7 +4547,7 @@
           <p:cNvPr id="7" name="TextBox 6">
             <a:extLst>
               <a:ext uri="{FF2B5EF4-FFF2-40B4-BE49-F238E27FC236}">
-                <a16:creationId xmlns:a16="http://schemas.microsoft.com/office/drawing/2014/main" xmlns="" id="{B4B1FE1F-6CD7-654F-8F56-C2F661931D17}"/>
+                <a16:creationId xmlns="" xmlns:a16="http://schemas.microsoft.com/office/drawing/2014/main" id="{B4B1FE1F-6CD7-654F-8F56-C2F661931D17}"/>
               </a:ext>
             </a:extLst>
           </p:cNvPr>
@@ -4605,7 +4605,7 @@
           <p:cNvPr id="8" name="그림 7">
             <a:extLst>
               <a:ext uri="{FF2B5EF4-FFF2-40B4-BE49-F238E27FC236}">
-                <a16:creationId xmlns:a16="http://schemas.microsoft.com/office/drawing/2014/main" xmlns="" id="{434B5C57-8B8B-1A4A-B338-3D39BA11B5B9}"/>
+                <a16:creationId xmlns="" xmlns:a16="http://schemas.microsoft.com/office/drawing/2014/main" id="{434B5C57-8B8B-1A4A-B338-3D39BA11B5B9}"/>
               </a:ext>
             </a:extLst>
           </p:cNvPr>
@@ -4678,7 +4678,7 @@
           <p:cNvPr id="5" name="슬라이드 번호 개체 틀 4">
             <a:extLst>
               <a:ext uri="{FF2B5EF4-FFF2-40B4-BE49-F238E27FC236}">
-                <a16:creationId xmlns:a16="http://schemas.microsoft.com/office/drawing/2014/main" xmlns="" id="{9FA75F19-B7A8-6A4F-A5D3-84D9FFF88627}"/>
+                <a16:creationId xmlns="" xmlns:a16="http://schemas.microsoft.com/office/drawing/2014/main" id="{9FA75F19-B7A8-6A4F-A5D3-84D9FFF88627}"/>
               </a:ext>
             </a:extLst>
           </p:cNvPr>
@@ -4707,7 +4707,7 @@
           <p:cNvPr id="6" name="TextBox 5">
             <a:extLst>
               <a:ext uri="{FF2B5EF4-FFF2-40B4-BE49-F238E27FC236}">
-                <a16:creationId xmlns:a16="http://schemas.microsoft.com/office/drawing/2014/main" xmlns="" id="{255C3C49-883C-204B-8A2C-B220C66630BD}"/>
+                <a16:creationId xmlns="" xmlns:a16="http://schemas.microsoft.com/office/drawing/2014/main" id="{255C3C49-883C-204B-8A2C-B220C66630BD}"/>
               </a:ext>
             </a:extLst>
           </p:cNvPr>
@@ -5118,7 +5118,7 @@
           <p:cNvPr id="7" name="TextBox 6">
             <a:extLst>
               <a:ext uri="{FF2B5EF4-FFF2-40B4-BE49-F238E27FC236}">
-                <a16:creationId xmlns:a16="http://schemas.microsoft.com/office/drawing/2014/main" xmlns="" id="{B4B1FE1F-6CD7-654F-8F56-C2F661931D17}"/>
+                <a16:creationId xmlns="" xmlns:a16="http://schemas.microsoft.com/office/drawing/2014/main" id="{B4B1FE1F-6CD7-654F-8F56-C2F661931D17}"/>
               </a:ext>
             </a:extLst>
           </p:cNvPr>
@@ -5166,7 +5166,7 @@
           <p:cNvPr id="8" name="그림 7">
             <a:extLst>
               <a:ext uri="{FF2B5EF4-FFF2-40B4-BE49-F238E27FC236}">
-                <a16:creationId xmlns:a16="http://schemas.microsoft.com/office/drawing/2014/main" xmlns="" id="{434B5C57-8B8B-1A4A-B338-3D39BA11B5B9}"/>
+                <a16:creationId xmlns="" xmlns:a16="http://schemas.microsoft.com/office/drawing/2014/main" id="{434B5C57-8B8B-1A4A-B338-3D39BA11B5B9}"/>
               </a:ext>
             </a:extLst>
           </p:cNvPr>
@@ -5283,7 +5283,7 @@
           <p:cNvPr id="5" name="슬라이드 번호 개체 틀 4">
             <a:extLst>
               <a:ext uri="{FF2B5EF4-FFF2-40B4-BE49-F238E27FC236}">
-                <a16:creationId xmlns:a16="http://schemas.microsoft.com/office/drawing/2014/main" xmlns="" id="{9FA75F19-B7A8-6A4F-A5D3-84D9FFF88627}"/>
+                <a16:creationId xmlns="" xmlns:a16="http://schemas.microsoft.com/office/drawing/2014/main" id="{9FA75F19-B7A8-6A4F-A5D3-84D9FFF88627}"/>
               </a:ext>
             </a:extLst>
           </p:cNvPr>
@@ -5318,7 +5318,7 @@
           <p:cNvPr id="6" name="TextBox 5">
             <a:extLst>
               <a:ext uri="{FF2B5EF4-FFF2-40B4-BE49-F238E27FC236}">
-                <a16:creationId xmlns:a16="http://schemas.microsoft.com/office/drawing/2014/main" xmlns="" id="{255C3C49-883C-204B-8A2C-B220C66630BD}"/>
+                <a16:creationId xmlns="" xmlns:a16="http://schemas.microsoft.com/office/drawing/2014/main" id="{255C3C49-883C-204B-8A2C-B220C66630BD}"/>
               </a:ext>
             </a:extLst>
           </p:cNvPr>
@@ -5619,7 +5619,7 @@
                 <a:latin typeface="Arial" panose="020B0604020202020204" pitchFamily="34" charset="0"/>
                 <a:cs typeface="Arial" panose="020B0604020202020204" pitchFamily="34" charset="0"/>
               </a:rPr>
-              <a:t>5 </a:t>
+              <a:t>7</a:t>
             </a:r>
             <a:endParaRPr lang="en-US" altLang="ko-KR" sz="1600" b="1" dirty="0" smtClean="0">
               <a:latin typeface="Arial" panose="020B0604020202020204" pitchFamily="34" charset="0"/>
@@ -5793,7 +5793,7 @@
           <p:cNvPr id="7" name="TextBox 6">
             <a:extLst>
               <a:ext uri="{FF2B5EF4-FFF2-40B4-BE49-F238E27FC236}">
-                <a16:creationId xmlns:a16="http://schemas.microsoft.com/office/drawing/2014/main" xmlns="" id="{B4B1FE1F-6CD7-654F-8F56-C2F661931D17}"/>
+                <a16:creationId xmlns="" xmlns:a16="http://schemas.microsoft.com/office/drawing/2014/main" id="{B4B1FE1F-6CD7-654F-8F56-C2F661931D17}"/>
               </a:ext>
             </a:extLst>
           </p:cNvPr>
@@ -5851,7 +5851,7 @@
           <p:cNvPr id="8" name="그림 7">
             <a:extLst>
               <a:ext uri="{FF2B5EF4-FFF2-40B4-BE49-F238E27FC236}">
-                <a16:creationId xmlns:a16="http://schemas.microsoft.com/office/drawing/2014/main" xmlns="" id="{434B5C57-8B8B-1A4A-B338-3D39BA11B5B9}"/>
+                <a16:creationId xmlns="" xmlns:a16="http://schemas.microsoft.com/office/drawing/2014/main" id="{434B5C57-8B8B-1A4A-B338-3D39BA11B5B9}"/>
               </a:ext>
             </a:extLst>
           </p:cNvPr>
@@ -5924,7 +5924,7 @@
           <p:cNvPr id="5" name="슬라이드 번호 개체 틀 4">
             <a:extLst>
               <a:ext uri="{FF2B5EF4-FFF2-40B4-BE49-F238E27FC236}">
-                <a16:creationId xmlns:a16="http://schemas.microsoft.com/office/drawing/2014/main" xmlns="" id="{9FA75F19-B7A8-6A4F-A5D3-84D9FFF88627}"/>
+                <a16:creationId xmlns="" xmlns:a16="http://schemas.microsoft.com/office/drawing/2014/main" id="{9FA75F19-B7A8-6A4F-A5D3-84D9FFF88627}"/>
               </a:ext>
             </a:extLst>
           </p:cNvPr>
@@ -5953,7 +5953,7 @@
           <p:cNvPr id="7" name="TextBox 6">
             <a:extLst>
               <a:ext uri="{FF2B5EF4-FFF2-40B4-BE49-F238E27FC236}">
-                <a16:creationId xmlns:a16="http://schemas.microsoft.com/office/drawing/2014/main" xmlns="" id="{B4B1FE1F-6CD7-654F-8F56-C2F661931D17}"/>
+                <a16:creationId xmlns="" xmlns:a16="http://schemas.microsoft.com/office/drawing/2014/main" id="{B4B1FE1F-6CD7-654F-8F56-C2F661931D17}"/>
               </a:ext>
             </a:extLst>
           </p:cNvPr>
@@ -6002,7 +6002,7 @@
           <p:cNvPr id="8" name="그림 7">
             <a:extLst>
               <a:ext uri="{FF2B5EF4-FFF2-40B4-BE49-F238E27FC236}">
-                <a16:creationId xmlns:a16="http://schemas.microsoft.com/office/drawing/2014/main" xmlns="" id="{434B5C57-8B8B-1A4A-B338-3D39BA11B5B9}"/>
+                <a16:creationId xmlns="" xmlns:a16="http://schemas.microsoft.com/office/drawing/2014/main" id="{434B5C57-8B8B-1A4A-B338-3D39BA11B5B9}"/>
               </a:ext>
             </a:extLst>
           </p:cNvPr>
@@ -6337,7 +6337,7 @@
           <p:cNvPr id="5" name="슬라이드 번호 개체 틀 4">
             <a:extLst>
               <a:ext uri="{FF2B5EF4-FFF2-40B4-BE49-F238E27FC236}">
-                <a16:creationId xmlns:a16="http://schemas.microsoft.com/office/drawing/2014/main" xmlns="" id="{9FA75F19-B7A8-6A4F-A5D3-84D9FFF88627}"/>
+                <a16:creationId xmlns="" xmlns:a16="http://schemas.microsoft.com/office/drawing/2014/main" id="{9FA75F19-B7A8-6A4F-A5D3-84D9FFF88627}"/>
               </a:ext>
             </a:extLst>
           </p:cNvPr>
@@ -6366,7 +6366,7 @@
           <p:cNvPr id="7" name="TextBox 6">
             <a:extLst>
               <a:ext uri="{FF2B5EF4-FFF2-40B4-BE49-F238E27FC236}">
-                <a16:creationId xmlns:a16="http://schemas.microsoft.com/office/drawing/2014/main" xmlns="" id="{B4B1FE1F-6CD7-654F-8F56-C2F661931D17}"/>
+                <a16:creationId xmlns="" xmlns:a16="http://schemas.microsoft.com/office/drawing/2014/main" id="{B4B1FE1F-6CD7-654F-8F56-C2F661931D17}"/>
               </a:ext>
             </a:extLst>
           </p:cNvPr>
@@ -6402,7 +6402,7 @@
           <p:cNvPr id="8" name="그림 7">
             <a:extLst>
               <a:ext uri="{FF2B5EF4-FFF2-40B4-BE49-F238E27FC236}">
-                <a16:creationId xmlns:a16="http://schemas.microsoft.com/office/drawing/2014/main" xmlns="" id="{434B5C57-8B8B-1A4A-B338-3D39BA11B5B9}"/>
+                <a16:creationId xmlns="" xmlns:a16="http://schemas.microsoft.com/office/drawing/2014/main" id="{434B5C57-8B8B-1A4A-B338-3D39BA11B5B9}"/>
               </a:ext>
             </a:extLst>
           </p:cNvPr>
@@ -6494,7 +6494,7 @@
       </p:pic>
       <p:pic>
         <p:nvPicPr>
-          <p:cNvPr id="3" name="그림 2"/>
+          <p:cNvPr id="4" name="그림 3"/>
           <p:cNvPicPr>
             <a:picLocks noChangeAspect="1"/>
           </p:cNvPicPr>
@@ -6508,8 +6508,8 @@
         </p:blipFill>
         <p:spPr>
           <a:xfrm>
-            <a:off x="53752" y="3068960"/>
-            <a:ext cx="9036496" cy="2853977"/>
+            <a:off x="70776" y="5726486"/>
+            <a:ext cx="7741583" cy="1029851"/>
           </a:xfrm>
           <a:prstGeom prst="rect">
             <a:avLst/>
@@ -6518,7 +6518,7 @@
       </p:pic>
       <p:pic>
         <p:nvPicPr>
-          <p:cNvPr id="4" name="그림 3"/>
+          <p:cNvPr id="6" name="그림 5"/>
           <p:cNvPicPr>
             <a:picLocks noChangeAspect="1"/>
           </p:cNvPicPr>
@@ -6532,8 +6532,8 @@
         </p:blipFill>
         <p:spPr>
           <a:xfrm>
-            <a:off x="70776" y="5726486"/>
-            <a:ext cx="7741583" cy="1029851"/>
+            <a:off x="70776" y="3073865"/>
+            <a:ext cx="8965720" cy="2664942"/>
           </a:xfrm>
           <a:prstGeom prst="rect">
             <a:avLst/>

</xml_diff>